<commit_message>
SDLC W3 opdr 3
</commit_message>
<xml_diff>
--- a/SDLC/SDLC1/W3/L3/3 van klassendiagram naar typed PHP zonder uitwerkingen.pptx
+++ b/SDLC/SDLC1/W3/L3/3 van klassendiagram naar typed PHP zonder uitwerkingen.pptx
@@ -213,7 +213,7 @@
           <a:p>
             <a:fld id="{7F804D45-DB65-4FB5-BD3B-CE3360EA7805}" type="datetimeFigureOut">
               <a:rPr lang="nl-NL" smtClean="0"/>
-              <a:t>22-9-2022</a:t>
+              <a:t>29-9-2022</a:t>
             </a:fld>
             <a:endParaRPr lang="nl-NL"/>
           </a:p>
@@ -378,7 +378,7 @@
           <a:p>
             <a:fld id="{755D046A-610E-425C-BC6D-89759F0DFCF8}" type="datetimeFigureOut">
               <a:rPr lang="nl-NL" smtClean="0"/>
-              <a:t>22-9-2022</a:t>
+              <a:t>29-9-2022</a:t>
             </a:fld>
             <a:endParaRPr lang="nl-NL"/>
           </a:p>
@@ -2634,7 +2634,7 @@
           <a:p>
             <a:fld id="{4E6470DB-20F1-4C16-8556-41DB60DB9BD3}" type="datetimeFigureOut">
               <a:rPr lang="nl-NL" smtClean="0"/>
-              <a:t>22-9-2022</a:t>
+              <a:t>29-9-2022</a:t>
             </a:fld>
             <a:endParaRPr lang="nl-NL"/>
           </a:p>
@@ -2802,7 +2802,7 @@
           <a:p>
             <a:fld id="{4E6470DB-20F1-4C16-8556-41DB60DB9BD3}" type="datetimeFigureOut">
               <a:rPr lang="nl-NL" smtClean="0"/>
-              <a:t>22-9-2022</a:t>
+              <a:t>29-9-2022</a:t>
             </a:fld>
             <a:endParaRPr lang="nl-NL"/>
           </a:p>
@@ -2980,7 +2980,7 @@
           <a:p>
             <a:fld id="{4E6470DB-20F1-4C16-8556-41DB60DB9BD3}" type="datetimeFigureOut">
               <a:rPr lang="nl-NL" smtClean="0"/>
-              <a:t>22-9-2022</a:t>
+              <a:t>29-9-2022</a:t>
             </a:fld>
             <a:endParaRPr lang="nl-NL"/>
           </a:p>
@@ -3148,7 +3148,7 @@
           <a:p>
             <a:fld id="{4E6470DB-20F1-4C16-8556-41DB60DB9BD3}" type="datetimeFigureOut">
               <a:rPr lang="nl-NL" smtClean="0"/>
-              <a:t>22-9-2022</a:t>
+              <a:t>29-9-2022</a:t>
             </a:fld>
             <a:endParaRPr lang="nl-NL"/>
           </a:p>
@@ -3393,7 +3393,7 @@
           <a:p>
             <a:fld id="{4E6470DB-20F1-4C16-8556-41DB60DB9BD3}" type="datetimeFigureOut">
               <a:rPr lang="nl-NL" smtClean="0"/>
-              <a:t>22-9-2022</a:t>
+              <a:t>29-9-2022</a:t>
             </a:fld>
             <a:endParaRPr lang="nl-NL"/>
           </a:p>
@@ -3622,7 +3622,7 @@
           <a:p>
             <a:fld id="{4E6470DB-20F1-4C16-8556-41DB60DB9BD3}" type="datetimeFigureOut">
               <a:rPr lang="nl-NL" smtClean="0"/>
-              <a:t>22-9-2022</a:t>
+              <a:t>29-9-2022</a:t>
             </a:fld>
             <a:endParaRPr lang="nl-NL"/>
           </a:p>
@@ -3986,7 +3986,7 @@
           <a:p>
             <a:fld id="{4E6470DB-20F1-4C16-8556-41DB60DB9BD3}" type="datetimeFigureOut">
               <a:rPr lang="nl-NL" smtClean="0"/>
-              <a:t>22-9-2022</a:t>
+              <a:t>29-9-2022</a:t>
             </a:fld>
             <a:endParaRPr lang="nl-NL"/>
           </a:p>
@@ -4103,7 +4103,7 @@
           <a:p>
             <a:fld id="{4E6470DB-20F1-4C16-8556-41DB60DB9BD3}" type="datetimeFigureOut">
               <a:rPr lang="nl-NL" smtClean="0"/>
-              <a:t>22-9-2022</a:t>
+              <a:t>29-9-2022</a:t>
             </a:fld>
             <a:endParaRPr lang="nl-NL"/>
           </a:p>
@@ -4198,7 +4198,7 @@
           <a:p>
             <a:fld id="{4E6470DB-20F1-4C16-8556-41DB60DB9BD3}" type="datetimeFigureOut">
               <a:rPr lang="nl-NL" smtClean="0"/>
-              <a:t>22-9-2022</a:t>
+              <a:t>29-9-2022</a:t>
             </a:fld>
             <a:endParaRPr lang="nl-NL"/>
           </a:p>
@@ -4473,7 +4473,7 @@
           <a:p>
             <a:fld id="{4E6470DB-20F1-4C16-8556-41DB60DB9BD3}" type="datetimeFigureOut">
               <a:rPr lang="nl-NL" smtClean="0"/>
-              <a:t>22-9-2022</a:t>
+              <a:t>29-9-2022</a:t>
             </a:fld>
             <a:endParaRPr lang="nl-NL"/>
           </a:p>
@@ -4725,7 +4725,7 @@
           <a:p>
             <a:fld id="{4E6470DB-20F1-4C16-8556-41DB60DB9BD3}" type="datetimeFigureOut">
               <a:rPr lang="nl-NL" smtClean="0"/>
-              <a:t>22-9-2022</a:t>
+              <a:t>29-9-2022</a:t>
             </a:fld>
             <a:endParaRPr lang="nl-NL"/>
           </a:p>
@@ -4936,7 +4936,7 @@
           <a:p>
             <a:fld id="{4E6470DB-20F1-4C16-8556-41DB60DB9BD3}" type="datetimeFigureOut">
               <a:rPr lang="nl-NL" smtClean="0"/>
-              <a:t>22-9-2022</a:t>
+              <a:t>29-9-2022</a:t>
             </a:fld>
             <a:endParaRPr lang="nl-NL"/>
           </a:p>

</xml_diff>